<commit_message>
Update TouchDown Präsentation UniRisk.pptx
</commit_message>
<xml_diff>
--- a/Dokumente/02_Arbeitsbereich/01_Projekthandbuch/TouchDown Präsentation UniRisk.pptx
+++ b/Dokumente/02_Arbeitsbereich/01_Projekthandbuch/TouchDown Präsentation UniRisk.pptx
@@ -5,17 +5,20 @@
     <p:sldMasterId id="2147483648" r:id="rId1"/>
   </p:sldMasterIdLst>
   <p:notesMasterIdLst>
-    <p:notesMasterId r:id="rId10"/>
+    <p:notesMasterId r:id="rId13"/>
   </p:notesMasterIdLst>
   <p:sldIdLst>
     <p:sldId id="256" r:id="rId2"/>
     <p:sldId id="257" r:id="rId3"/>
     <p:sldId id="258" r:id="rId4"/>
     <p:sldId id="259" r:id="rId5"/>
-    <p:sldId id="260" r:id="rId6"/>
-    <p:sldId id="261" r:id="rId7"/>
-    <p:sldId id="262" r:id="rId8"/>
-    <p:sldId id="263" r:id="rId9"/>
+    <p:sldId id="264" r:id="rId6"/>
+    <p:sldId id="265" r:id="rId7"/>
+    <p:sldId id="266" r:id="rId8"/>
+    <p:sldId id="267" r:id="rId9"/>
+    <p:sldId id="260" r:id="rId10"/>
+    <p:sldId id="261" r:id="rId11"/>
+    <p:sldId id="263" r:id="rId12"/>
   </p:sldIdLst>
   <p:sldSz cx="12192000" cy="6858000"/>
   <p:notesSz cx="6858000" cy="9144000"/>
@@ -123,13 +126,19 @@
             <p14:sldId id="257"/>
             <p14:sldId id="258"/>
             <p14:sldId id="259"/>
+            <p14:sldId id="264"/>
+            <p14:sldId id="265"/>
+            <p14:sldId id="266"/>
+            <p14:sldId id="267"/>
             <p14:sldId id="260"/>
             <p14:sldId id="261"/>
-            <p14:sldId id="262"/>
             <p14:sldId id="263"/>
           </p14:sldIdLst>
         </p14:section>
       </p14:sectionLst>
+    </p:ext>
+    <p:ext uri="{EFAFB233-063F-42B5-8137-9DF3F51BA10A}">
+      <p15:sldGuideLst xmlns:p15="http://schemas.microsoft.com/office/powerpoint/2012/main"/>
     </p:ext>
   </p:extLst>
 </p:presentation>
@@ -534,7 +543,7 @@
           <a:noFill/>
           <a:extLst>
             <a:ext uri="{909E8E84-426E-40dd-AFC4-6F175D3DCCD1}">
-              <a14:hiddenFill xmlns:a14="http://schemas.microsoft.com/office/drawing/2010/main" xmlns="">
+              <a14:hiddenFill xmlns="" xmlns:a14="http://schemas.microsoft.com/office/drawing/2010/main">
                 <a:solidFill>
                   <a:srgbClr val="FFFFFF"/>
                 </a:solidFill>
@@ -594,7 +603,7 @@
             </a:ln>
             <a:extLst>
               <a:ext uri="{91240B29-F687-4f45-9708-019B960494DF}">
-                <a14:hiddenLine xmlns:a14="http://schemas.microsoft.com/office/drawing/2010/main" xmlns="" w="9525">
+                <a14:hiddenLine xmlns="" xmlns:a14="http://schemas.microsoft.com/office/drawing/2010/main" w="9525">
                   <a:solidFill>
                     <a:srgbClr val="000000"/>
                   </a:solidFill>
@@ -684,7 +693,7 @@
             </a:ln>
             <a:extLst>
               <a:ext uri="{91240B29-F687-4f45-9708-019B960494DF}">
-                <a14:hiddenLine xmlns:a14="http://schemas.microsoft.com/office/drawing/2010/main" xmlns="" w="9525">
+                <a14:hiddenLine xmlns="" xmlns:a14="http://schemas.microsoft.com/office/drawing/2010/main" w="9525">
                   <a:solidFill>
                     <a:srgbClr val="000000"/>
                   </a:solidFill>
@@ -774,7 +783,7 @@
             </a:ln>
             <a:extLst>
               <a:ext uri="{91240B29-F687-4f45-9708-019B960494DF}">
-                <a14:hiddenLine xmlns:a14="http://schemas.microsoft.com/office/drawing/2010/main" xmlns="" w="9525">
+                <a14:hiddenLine xmlns="" xmlns:a14="http://schemas.microsoft.com/office/drawing/2010/main" w="9525">
                   <a:solidFill>
                     <a:srgbClr val="000000"/>
                   </a:solidFill>
@@ -808,7 +817,7 @@
             </a:ln>
             <a:extLst>
               <a:ext uri="{91240B29-F687-4f45-9708-019B960494DF}">
-                <a14:hiddenLine xmlns:a14="http://schemas.microsoft.com/office/drawing/2010/main" xmlns="" w="9525">
+                <a14:hiddenLine xmlns="" xmlns:a14="http://schemas.microsoft.com/office/drawing/2010/main" w="9525">
                   <a:solidFill>
                     <a:srgbClr val="000000"/>
                   </a:solidFill>
@@ -898,7 +907,7 @@
             </a:ln>
             <a:extLst>
               <a:ext uri="{91240B29-F687-4f45-9708-019B960494DF}">
-                <a14:hiddenLine xmlns:a14="http://schemas.microsoft.com/office/drawing/2010/main" xmlns="" w="9525">
+                <a14:hiddenLine xmlns="" xmlns:a14="http://schemas.microsoft.com/office/drawing/2010/main" w="9525">
                   <a:solidFill>
                     <a:srgbClr val="000000"/>
                   </a:solidFill>
@@ -960,7 +969,7 @@
             </a:ln>
             <a:extLst>
               <a:ext uri="{91240B29-F687-4f45-9708-019B960494DF}">
-                <a14:hiddenLine xmlns:a14="http://schemas.microsoft.com/office/drawing/2010/main" xmlns="" w="9525">
+                <a14:hiddenLine xmlns="" xmlns:a14="http://schemas.microsoft.com/office/drawing/2010/main" w="9525">
                   <a:solidFill>
                     <a:srgbClr val="000000"/>
                   </a:solidFill>
@@ -1022,7 +1031,7 @@
             </a:ln>
             <a:extLst>
               <a:ext uri="{91240B29-F687-4f45-9708-019B960494DF}">
-                <a14:hiddenLine xmlns:a14="http://schemas.microsoft.com/office/drawing/2010/main" xmlns="" w="9525">
+                <a14:hiddenLine xmlns="" xmlns:a14="http://schemas.microsoft.com/office/drawing/2010/main" w="9525">
                   <a:solidFill>
                     <a:srgbClr val="000000"/>
                   </a:solidFill>
@@ -1112,7 +1121,7 @@
             </a:ln>
             <a:extLst>
               <a:ext uri="{91240B29-F687-4f45-9708-019B960494DF}">
-                <a14:hiddenLine xmlns:a14="http://schemas.microsoft.com/office/drawing/2010/main" xmlns="" w="9525">
+                <a14:hiddenLine xmlns="" xmlns:a14="http://schemas.microsoft.com/office/drawing/2010/main" w="9525">
                   <a:solidFill>
                     <a:srgbClr val="000000"/>
                   </a:solidFill>
@@ -1174,7 +1183,7 @@
             </a:ln>
             <a:extLst>
               <a:ext uri="{91240B29-F687-4f45-9708-019B960494DF}">
-                <a14:hiddenLine xmlns:a14="http://schemas.microsoft.com/office/drawing/2010/main" xmlns="" w="9525">
+                <a14:hiddenLine xmlns="" xmlns:a14="http://schemas.microsoft.com/office/drawing/2010/main" w="9525">
                   <a:solidFill>
                     <a:srgbClr val="000000"/>
                   </a:solidFill>
@@ -1236,7 +1245,7 @@
             </a:ln>
             <a:extLst>
               <a:ext uri="{91240B29-F687-4f45-9708-019B960494DF}">
-                <a14:hiddenLine xmlns:a14="http://schemas.microsoft.com/office/drawing/2010/main" xmlns="" w="9525">
+                <a14:hiddenLine xmlns="" xmlns:a14="http://schemas.microsoft.com/office/drawing/2010/main" w="9525">
                   <a:solidFill>
                     <a:srgbClr val="000000"/>
                   </a:solidFill>
@@ -1326,7 +1335,7 @@
             </a:ln>
             <a:extLst>
               <a:ext uri="{91240B29-F687-4f45-9708-019B960494DF}">
-                <a14:hiddenLine xmlns:a14="http://schemas.microsoft.com/office/drawing/2010/main" xmlns="" w="9525">
+                <a14:hiddenLine xmlns="" xmlns:a14="http://schemas.microsoft.com/office/drawing/2010/main" w="9525">
                   <a:solidFill>
                     <a:srgbClr val="000000"/>
                   </a:solidFill>
@@ -1416,7 +1425,7 @@
             </a:ln>
             <a:extLst>
               <a:ext uri="{91240B29-F687-4f45-9708-019B960494DF}">
-                <a14:hiddenLine xmlns:a14="http://schemas.microsoft.com/office/drawing/2010/main" xmlns="" w="9525">
+                <a14:hiddenLine xmlns="" xmlns:a14="http://schemas.microsoft.com/office/drawing/2010/main" w="9525">
                   <a:solidFill>
                     <a:srgbClr val="000000"/>
                   </a:solidFill>
@@ -1478,7 +1487,7 @@
             </a:ln>
             <a:extLst>
               <a:ext uri="{91240B29-F687-4f45-9708-019B960494DF}">
-                <a14:hiddenLine xmlns:a14="http://schemas.microsoft.com/office/drawing/2010/main" xmlns="" w="9525">
+                <a14:hiddenLine xmlns="" xmlns:a14="http://schemas.microsoft.com/office/drawing/2010/main" w="9525">
                   <a:solidFill>
                     <a:srgbClr val="000000"/>
                   </a:solidFill>
@@ -1588,7 +1597,7 @@
             </a:ln>
             <a:extLst>
               <a:ext uri="{91240B29-F687-4f45-9708-019B960494DF}">
-                <a14:hiddenLine xmlns:a14="http://schemas.microsoft.com/office/drawing/2010/main" xmlns="" w="9525">
+                <a14:hiddenLine xmlns="" xmlns:a14="http://schemas.microsoft.com/office/drawing/2010/main" w="9525">
                   <a:solidFill>
                     <a:srgbClr val="000000"/>
                   </a:solidFill>
@@ -1650,7 +1659,7 @@
             </a:ln>
             <a:extLst>
               <a:ext uri="{91240B29-F687-4f45-9708-019B960494DF}">
-                <a14:hiddenLine xmlns:a14="http://schemas.microsoft.com/office/drawing/2010/main" xmlns="" w="9525">
+                <a14:hiddenLine xmlns="" xmlns:a14="http://schemas.microsoft.com/office/drawing/2010/main" w="9525">
                   <a:solidFill>
                     <a:srgbClr val="000000"/>
                   </a:solidFill>
@@ -1740,7 +1749,7 @@
             </a:ln>
             <a:extLst>
               <a:ext uri="{91240B29-F687-4f45-9708-019B960494DF}">
-                <a14:hiddenLine xmlns:a14="http://schemas.microsoft.com/office/drawing/2010/main" xmlns="" w="9525">
+                <a14:hiddenLine xmlns="" xmlns:a14="http://schemas.microsoft.com/office/drawing/2010/main" w="9525">
                   <a:solidFill>
                     <a:srgbClr val="000000"/>
                   </a:solidFill>
@@ -1830,7 +1839,7 @@
             </a:ln>
             <a:extLst>
               <a:ext uri="{91240B29-F687-4f45-9708-019B960494DF}">
-                <a14:hiddenLine xmlns:a14="http://schemas.microsoft.com/office/drawing/2010/main" xmlns="" w="9525">
+                <a14:hiddenLine xmlns="" xmlns:a14="http://schemas.microsoft.com/office/drawing/2010/main" w="9525">
                   <a:solidFill>
                     <a:srgbClr val="000000"/>
                   </a:solidFill>
@@ -1892,7 +1901,7 @@
             </a:ln>
             <a:extLst>
               <a:ext uri="{91240B29-F687-4f45-9708-019B960494DF}">
-                <a14:hiddenLine xmlns:a14="http://schemas.microsoft.com/office/drawing/2010/main" xmlns="" w="9525">
+                <a14:hiddenLine xmlns="" xmlns:a14="http://schemas.microsoft.com/office/drawing/2010/main" w="9525">
                   <a:solidFill>
                     <a:srgbClr val="000000"/>
                   </a:solidFill>
@@ -1982,7 +1991,7 @@
             </a:ln>
             <a:extLst>
               <a:ext uri="{91240B29-F687-4f45-9708-019B960494DF}">
-                <a14:hiddenLine xmlns:a14="http://schemas.microsoft.com/office/drawing/2010/main" xmlns="" w="9525">
+                <a14:hiddenLine xmlns="" xmlns:a14="http://schemas.microsoft.com/office/drawing/2010/main" w="9525">
                   <a:solidFill>
                     <a:srgbClr val="000000"/>
                   </a:solidFill>
@@ -2072,7 +2081,7 @@
             </a:ln>
             <a:extLst>
               <a:ext uri="{91240B29-F687-4f45-9708-019B960494DF}">
-                <a14:hiddenLine xmlns:a14="http://schemas.microsoft.com/office/drawing/2010/main" xmlns="" w="9525">
+                <a14:hiddenLine xmlns="" xmlns:a14="http://schemas.microsoft.com/office/drawing/2010/main" w="9525">
                   <a:solidFill>
                     <a:srgbClr val="000000"/>
                   </a:solidFill>
@@ -2128,7 +2137,7 @@
             </a:ln>
             <a:extLst>
               <a:ext uri="{91240B29-F687-4f45-9708-019B960494DF}">
-                <a14:hiddenLine xmlns:a14="http://schemas.microsoft.com/office/drawing/2010/main" xmlns="" w="9525">
+                <a14:hiddenLine xmlns="" xmlns:a14="http://schemas.microsoft.com/office/drawing/2010/main" w="9525">
                   <a:solidFill>
                     <a:srgbClr val="000000"/>
                   </a:solidFill>
@@ -2218,7 +2227,7 @@
             </a:ln>
             <a:extLst>
               <a:ext uri="{91240B29-F687-4f45-9708-019B960494DF}">
-                <a14:hiddenLine xmlns:a14="http://schemas.microsoft.com/office/drawing/2010/main" xmlns="" w="9525">
+                <a14:hiddenLine xmlns="" xmlns:a14="http://schemas.microsoft.com/office/drawing/2010/main" w="9525">
                   <a:solidFill>
                     <a:srgbClr val="000000"/>
                   </a:solidFill>
@@ -2274,7 +2283,7 @@
             </a:ln>
             <a:extLst>
               <a:ext uri="{91240B29-F687-4f45-9708-019B960494DF}">
-                <a14:hiddenLine xmlns:a14="http://schemas.microsoft.com/office/drawing/2010/main" xmlns="" w="9525">
+                <a14:hiddenLine xmlns="" xmlns:a14="http://schemas.microsoft.com/office/drawing/2010/main" w="9525">
                   <a:solidFill>
                     <a:srgbClr val="000000"/>
                   </a:solidFill>
@@ -2364,7 +2373,7 @@
             </a:ln>
             <a:extLst>
               <a:ext uri="{91240B29-F687-4f45-9708-019B960494DF}">
-                <a14:hiddenLine xmlns:a14="http://schemas.microsoft.com/office/drawing/2010/main" xmlns="" w="9525">
+                <a14:hiddenLine xmlns="" xmlns:a14="http://schemas.microsoft.com/office/drawing/2010/main" w="9525">
                   <a:solidFill>
                     <a:srgbClr val="000000"/>
                   </a:solidFill>
@@ -2432,7 +2441,7 @@
             </a:ln>
             <a:extLst>
               <a:ext uri="{91240B29-F687-4f45-9708-019B960494DF}">
-                <a14:hiddenLine xmlns:a14="http://schemas.microsoft.com/office/drawing/2010/main" xmlns="" w="9525">
+                <a14:hiddenLine xmlns="" xmlns:a14="http://schemas.microsoft.com/office/drawing/2010/main" w="9525">
                   <a:solidFill>
                     <a:srgbClr val="000000"/>
                   </a:solidFill>
@@ -2522,7 +2531,7 @@
             </a:ln>
             <a:extLst>
               <a:ext uri="{91240B29-F687-4f45-9708-019B960494DF}">
-                <a14:hiddenLine xmlns:a14="http://schemas.microsoft.com/office/drawing/2010/main" xmlns="" w="9525">
+                <a14:hiddenLine xmlns="" xmlns:a14="http://schemas.microsoft.com/office/drawing/2010/main" w="9525">
                   <a:solidFill>
                     <a:srgbClr val="000000"/>
                   </a:solidFill>
@@ -2590,7 +2599,7 @@
             </a:ln>
             <a:extLst>
               <a:ext uri="{91240B29-F687-4f45-9708-019B960494DF}">
-                <a14:hiddenLine xmlns:a14="http://schemas.microsoft.com/office/drawing/2010/main" xmlns="" w="9525">
+                <a14:hiddenLine xmlns="" xmlns:a14="http://schemas.microsoft.com/office/drawing/2010/main" w="9525">
                   <a:solidFill>
                     <a:srgbClr val="000000"/>
                   </a:solidFill>
@@ -2680,7 +2689,7 @@
             </a:ln>
             <a:extLst>
               <a:ext uri="{91240B29-F687-4f45-9708-019B960494DF}">
-                <a14:hiddenLine xmlns:a14="http://schemas.microsoft.com/office/drawing/2010/main" xmlns="" w="9525">
+                <a14:hiddenLine xmlns="" xmlns:a14="http://schemas.microsoft.com/office/drawing/2010/main" w="9525">
                   <a:solidFill>
                     <a:srgbClr val="000000"/>
                   </a:solidFill>
@@ -2714,7 +2723,7 @@
             </a:ln>
             <a:extLst>
               <a:ext uri="{91240B29-F687-4f45-9708-019B960494DF}">
-                <a14:hiddenLine xmlns:a14="http://schemas.microsoft.com/office/drawing/2010/main" xmlns="" w="9525">
+                <a14:hiddenLine xmlns="" xmlns:a14="http://schemas.microsoft.com/office/drawing/2010/main" w="9525">
                   <a:solidFill>
                     <a:srgbClr val="000000"/>
                   </a:solidFill>
@@ -2804,7 +2813,7 @@
             </a:ln>
             <a:extLst>
               <a:ext uri="{91240B29-F687-4f45-9708-019B960494DF}">
-                <a14:hiddenLine xmlns:a14="http://schemas.microsoft.com/office/drawing/2010/main" xmlns="" w="9525">
+                <a14:hiddenLine xmlns="" xmlns:a14="http://schemas.microsoft.com/office/drawing/2010/main" w="9525">
                   <a:solidFill>
                     <a:srgbClr val="000000"/>
                   </a:solidFill>
@@ -2866,7 +2875,7 @@
             </a:ln>
             <a:extLst>
               <a:ext uri="{91240B29-F687-4f45-9708-019B960494DF}">
-                <a14:hiddenLine xmlns:a14="http://schemas.microsoft.com/office/drawing/2010/main" xmlns="" w="9525">
+                <a14:hiddenLine xmlns="" xmlns:a14="http://schemas.microsoft.com/office/drawing/2010/main" w="9525">
                   <a:solidFill>
                     <a:srgbClr val="000000"/>
                   </a:solidFill>
@@ -2928,7 +2937,7 @@
             </a:ln>
             <a:extLst>
               <a:ext uri="{91240B29-F687-4f45-9708-019B960494DF}">
-                <a14:hiddenLine xmlns:a14="http://schemas.microsoft.com/office/drawing/2010/main" xmlns="" w="9525">
+                <a14:hiddenLine xmlns="" xmlns:a14="http://schemas.microsoft.com/office/drawing/2010/main" w="9525">
                   <a:solidFill>
                     <a:srgbClr val="000000"/>
                   </a:solidFill>
@@ -3018,7 +3027,7 @@
             </a:ln>
             <a:extLst>
               <a:ext uri="{91240B29-F687-4f45-9708-019B960494DF}">
-                <a14:hiddenLine xmlns:a14="http://schemas.microsoft.com/office/drawing/2010/main" xmlns="" w="9525">
+                <a14:hiddenLine xmlns="" xmlns:a14="http://schemas.microsoft.com/office/drawing/2010/main" w="9525">
                   <a:solidFill>
                     <a:srgbClr val="000000"/>
                   </a:solidFill>
@@ -3086,7 +3095,7 @@
             </a:ln>
             <a:extLst>
               <a:ext uri="{91240B29-F687-4f45-9708-019B960494DF}">
-                <a14:hiddenLine xmlns:a14="http://schemas.microsoft.com/office/drawing/2010/main" xmlns="" w="9525">
+                <a14:hiddenLine xmlns="" xmlns:a14="http://schemas.microsoft.com/office/drawing/2010/main" w="9525">
                   <a:solidFill>
                     <a:srgbClr val="000000"/>
                   </a:solidFill>
@@ -3148,7 +3157,7 @@
             </a:ln>
             <a:extLst>
               <a:ext uri="{91240B29-F687-4f45-9708-019B960494DF}">
-                <a14:hiddenLine xmlns:a14="http://schemas.microsoft.com/office/drawing/2010/main" xmlns="" w="9525">
+                <a14:hiddenLine xmlns="" xmlns:a14="http://schemas.microsoft.com/office/drawing/2010/main" w="9525">
                   <a:solidFill>
                     <a:srgbClr val="000000"/>
                   </a:solidFill>
@@ -3238,7 +3247,7 @@
             </a:ln>
             <a:extLst>
               <a:ext uri="{91240B29-F687-4f45-9708-019B960494DF}">
-                <a14:hiddenLine xmlns:a14="http://schemas.microsoft.com/office/drawing/2010/main" xmlns="" w="9525">
+                <a14:hiddenLine xmlns="" xmlns:a14="http://schemas.microsoft.com/office/drawing/2010/main" w="9525">
                   <a:solidFill>
                     <a:srgbClr val="000000"/>
                   </a:solidFill>
@@ -3300,7 +3309,7 @@
             </a:ln>
             <a:extLst>
               <a:ext uri="{91240B29-F687-4f45-9708-019B960494DF}">
-                <a14:hiddenLine xmlns:a14="http://schemas.microsoft.com/office/drawing/2010/main" xmlns="" w="9525">
+                <a14:hiddenLine xmlns="" xmlns:a14="http://schemas.microsoft.com/office/drawing/2010/main" w="9525">
                   <a:solidFill>
                     <a:srgbClr val="000000"/>
                   </a:solidFill>
@@ -3390,7 +3399,7 @@
             </a:ln>
             <a:extLst>
               <a:ext uri="{91240B29-F687-4f45-9708-019B960494DF}">
-                <a14:hiddenLine xmlns:a14="http://schemas.microsoft.com/office/drawing/2010/main" xmlns="" w="9525">
+                <a14:hiddenLine xmlns="" xmlns:a14="http://schemas.microsoft.com/office/drawing/2010/main" w="9525">
                   <a:solidFill>
                     <a:srgbClr val="000000"/>
                   </a:solidFill>
@@ -3452,7 +3461,7 @@
             </a:ln>
             <a:extLst>
               <a:ext uri="{91240B29-F687-4f45-9708-019B960494DF}">
-                <a14:hiddenLine xmlns:a14="http://schemas.microsoft.com/office/drawing/2010/main" xmlns="" w="9525">
+                <a14:hiddenLine xmlns="" xmlns:a14="http://schemas.microsoft.com/office/drawing/2010/main" w="9525">
                   <a:solidFill>
                     <a:srgbClr val="000000"/>
                   </a:solidFill>
@@ -3542,7 +3551,7 @@
             </a:ln>
             <a:extLst>
               <a:ext uri="{91240B29-F687-4f45-9708-019B960494DF}">
-                <a14:hiddenLine xmlns:a14="http://schemas.microsoft.com/office/drawing/2010/main" xmlns="" w="9525">
+                <a14:hiddenLine xmlns="" xmlns:a14="http://schemas.microsoft.com/office/drawing/2010/main" w="9525">
                   <a:solidFill>
                     <a:srgbClr val="000000"/>
                   </a:solidFill>
@@ -3576,7 +3585,7 @@
             </a:ln>
             <a:extLst>
               <a:ext uri="{91240B29-F687-4f45-9708-019B960494DF}">
-                <a14:hiddenLine xmlns:a14="http://schemas.microsoft.com/office/drawing/2010/main" xmlns="" w="9525">
+                <a14:hiddenLine xmlns="" xmlns:a14="http://schemas.microsoft.com/office/drawing/2010/main" w="9525">
                   <a:solidFill>
                     <a:srgbClr val="000000"/>
                   </a:solidFill>
@@ -3641,7 +3650,7 @@
             </a:ln>
             <a:extLst>
               <a:ext uri="{91240B29-F687-4f45-9708-019B960494DF}">
-                <a14:hiddenLine xmlns:a14="http://schemas.microsoft.com/office/drawing/2010/main" xmlns="" w="9525">
+                <a14:hiddenLine xmlns="" xmlns:a14="http://schemas.microsoft.com/office/drawing/2010/main" w="9525">
                   <a:solidFill>
                     <a:srgbClr val="000000"/>
                   </a:solidFill>
@@ -3731,7 +3740,7 @@
             </a:ln>
             <a:extLst>
               <a:ext uri="{91240B29-F687-4f45-9708-019B960494DF}">
-                <a14:hiddenLine xmlns:a14="http://schemas.microsoft.com/office/drawing/2010/main" xmlns="" w="9525">
+                <a14:hiddenLine xmlns="" xmlns:a14="http://schemas.microsoft.com/office/drawing/2010/main" w="9525">
                   <a:solidFill>
                     <a:srgbClr val="000000"/>
                   </a:solidFill>
@@ -3793,7 +3802,7 @@
             </a:ln>
             <a:extLst>
               <a:ext uri="{91240B29-F687-4f45-9708-019B960494DF}">
-                <a14:hiddenLine xmlns:a14="http://schemas.microsoft.com/office/drawing/2010/main" xmlns="" w="9525">
+                <a14:hiddenLine xmlns="" xmlns:a14="http://schemas.microsoft.com/office/drawing/2010/main" w="9525">
                   <a:solidFill>
                     <a:srgbClr val="000000"/>
                   </a:solidFill>
@@ -3883,7 +3892,7 @@
             </a:ln>
             <a:extLst>
               <a:ext uri="{91240B29-F687-4f45-9708-019B960494DF}">
-                <a14:hiddenLine xmlns:a14="http://schemas.microsoft.com/office/drawing/2010/main" xmlns="" w="9525">
+                <a14:hiddenLine xmlns="" xmlns:a14="http://schemas.microsoft.com/office/drawing/2010/main" w="9525">
                   <a:solidFill>
                     <a:srgbClr val="000000"/>
                   </a:solidFill>
@@ -3973,7 +3982,7 @@
             </a:ln>
             <a:extLst>
               <a:ext uri="{91240B29-F687-4f45-9708-019B960494DF}">
-                <a14:hiddenLine xmlns:a14="http://schemas.microsoft.com/office/drawing/2010/main" xmlns="" w="9525">
+                <a14:hiddenLine xmlns="" xmlns:a14="http://schemas.microsoft.com/office/drawing/2010/main" w="9525">
                   <a:solidFill>
                     <a:srgbClr val="000000"/>
                   </a:solidFill>
@@ -4038,7 +4047,7 @@
             </a:ln>
             <a:extLst>
               <a:ext uri="{91240B29-F687-4f45-9708-019B960494DF}">
-                <a14:hiddenLine xmlns:a14="http://schemas.microsoft.com/office/drawing/2010/main" xmlns="" w="9525">
+                <a14:hiddenLine xmlns="" xmlns:a14="http://schemas.microsoft.com/office/drawing/2010/main" w="9525">
                   <a:solidFill>
                     <a:srgbClr val="000000"/>
                   </a:solidFill>
@@ -4100,7 +4109,7 @@
             </a:ln>
             <a:extLst>
               <a:ext uri="{91240B29-F687-4f45-9708-019B960494DF}">
-                <a14:hiddenLine xmlns:a14="http://schemas.microsoft.com/office/drawing/2010/main" xmlns="" w="9525">
+                <a14:hiddenLine xmlns="" xmlns:a14="http://schemas.microsoft.com/office/drawing/2010/main" w="9525">
                   <a:solidFill>
                     <a:srgbClr val="000000"/>
                   </a:solidFill>
@@ -4190,7 +4199,7 @@
             </a:ln>
             <a:extLst>
               <a:ext uri="{91240B29-F687-4f45-9708-019B960494DF}">
-                <a14:hiddenLine xmlns:a14="http://schemas.microsoft.com/office/drawing/2010/main" xmlns="" w="9525">
+                <a14:hiddenLine xmlns="" xmlns:a14="http://schemas.microsoft.com/office/drawing/2010/main" w="9525">
                   <a:solidFill>
                     <a:srgbClr val="000000"/>
                   </a:solidFill>
@@ -4280,7 +4289,7 @@
             </a:ln>
             <a:extLst>
               <a:ext uri="{91240B29-F687-4f45-9708-019B960494DF}">
-                <a14:hiddenLine xmlns:a14="http://schemas.microsoft.com/office/drawing/2010/main" xmlns="" w="9525">
+                <a14:hiddenLine xmlns="" xmlns:a14="http://schemas.microsoft.com/office/drawing/2010/main" w="9525">
                   <a:solidFill>
                     <a:srgbClr val="000000"/>
                   </a:solidFill>
@@ -4342,7 +4351,7 @@
             </a:ln>
             <a:extLst>
               <a:ext uri="{91240B29-F687-4f45-9708-019B960494DF}">
-                <a14:hiddenLine xmlns:a14="http://schemas.microsoft.com/office/drawing/2010/main" xmlns="" w="9525">
+                <a14:hiddenLine xmlns="" xmlns:a14="http://schemas.microsoft.com/office/drawing/2010/main" w="9525">
                   <a:solidFill>
                     <a:srgbClr val="000000"/>
                   </a:solidFill>
@@ -4462,7 +4471,7 @@
             </a:ln>
             <a:extLst>
               <a:ext uri="{91240B29-F687-4f45-9708-019B960494DF}">
-                <a14:hiddenLine xmlns:a14="http://schemas.microsoft.com/office/drawing/2010/main" xmlns="" w="9525">
+                <a14:hiddenLine xmlns="" xmlns:a14="http://schemas.microsoft.com/office/drawing/2010/main" w="9525">
                   <a:solidFill>
                     <a:srgbClr val="000000"/>
                   </a:solidFill>
@@ -4530,7 +4539,7 @@
             </a:ln>
             <a:extLst>
               <a:ext uri="{91240B29-F687-4f45-9708-019B960494DF}">
-                <a14:hiddenLine xmlns:a14="http://schemas.microsoft.com/office/drawing/2010/main" xmlns="" w="9525">
+                <a14:hiddenLine xmlns="" xmlns:a14="http://schemas.microsoft.com/office/drawing/2010/main" w="9525">
                   <a:solidFill>
                     <a:srgbClr val="000000"/>
                   </a:solidFill>
@@ -4620,7 +4629,7 @@
             </a:ln>
             <a:extLst>
               <a:ext uri="{91240B29-F687-4f45-9708-019B960494DF}">
-                <a14:hiddenLine xmlns:a14="http://schemas.microsoft.com/office/drawing/2010/main" xmlns="" w="9525">
+                <a14:hiddenLine xmlns="" xmlns:a14="http://schemas.microsoft.com/office/drawing/2010/main" w="9525">
                   <a:solidFill>
                     <a:srgbClr val="000000"/>
                   </a:solidFill>
@@ -9410,7 +9419,7 @@
           <a:noFill/>
           <a:extLst>
             <a:ext uri="{909E8E84-426E-40dd-AFC4-6F175D3DCCD1}">
-              <a14:hiddenFill xmlns:a14="http://schemas.microsoft.com/office/drawing/2010/main" xmlns="">
+              <a14:hiddenFill xmlns="" xmlns:a14="http://schemas.microsoft.com/office/drawing/2010/main">
                 <a:solidFill>
                   <a:srgbClr val="FFFFFF"/>
                 </a:solidFill>
@@ -9484,7 +9493,7 @@
               </a:ln>
               <a:extLst>
                 <a:ext uri="{91240B29-F687-4f45-9708-019B960494DF}">
-                  <a14:hiddenLine xmlns:a14="http://schemas.microsoft.com/office/drawing/2010/main" xmlns="" w="9525">
+                  <a14:hiddenLine xmlns="" xmlns:a14="http://schemas.microsoft.com/office/drawing/2010/main" w="9525">
                     <a:solidFill>
                       <a:srgbClr val="000000"/>
                     </a:solidFill>
@@ -9574,7 +9583,7 @@
               </a:ln>
               <a:extLst>
                 <a:ext uri="{91240B29-F687-4f45-9708-019B960494DF}">
-                  <a14:hiddenLine xmlns:a14="http://schemas.microsoft.com/office/drawing/2010/main" xmlns="" w="9525">
+                  <a14:hiddenLine xmlns="" xmlns:a14="http://schemas.microsoft.com/office/drawing/2010/main" w="9525">
                     <a:solidFill>
                       <a:srgbClr val="000000"/>
                     </a:solidFill>
@@ -9664,7 +9673,7 @@
               </a:ln>
               <a:extLst>
                 <a:ext uri="{91240B29-F687-4f45-9708-019B960494DF}">
-                  <a14:hiddenLine xmlns:a14="http://schemas.microsoft.com/office/drawing/2010/main" xmlns="" w="9525">
+                  <a14:hiddenLine xmlns="" xmlns:a14="http://schemas.microsoft.com/office/drawing/2010/main" w="9525">
                     <a:solidFill>
                       <a:srgbClr val="000000"/>
                     </a:solidFill>
@@ -9726,7 +9735,7 @@
               </a:ln>
               <a:extLst>
                 <a:ext uri="{91240B29-F687-4f45-9708-019B960494DF}">
-                  <a14:hiddenLine xmlns:a14="http://schemas.microsoft.com/office/drawing/2010/main" xmlns="" w="9525">
+                  <a14:hiddenLine xmlns="" xmlns:a14="http://schemas.microsoft.com/office/drawing/2010/main" w="9525">
                     <a:solidFill>
                       <a:srgbClr val="000000"/>
                     </a:solidFill>
@@ -9816,7 +9825,7 @@
               </a:ln>
               <a:extLst>
                 <a:ext uri="{91240B29-F687-4f45-9708-019B960494DF}">
-                  <a14:hiddenLine xmlns:a14="http://schemas.microsoft.com/office/drawing/2010/main" xmlns="" w="9525">
+                  <a14:hiddenLine xmlns="" xmlns:a14="http://schemas.microsoft.com/office/drawing/2010/main" w="9525">
                     <a:solidFill>
                       <a:srgbClr val="000000"/>
                     </a:solidFill>
@@ -9878,7 +9887,7 @@
               </a:ln>
               <a:extLst>
                 <a:ext uri="{91240B29-F687-4f45-9708-019B960494DF}">
-                  <a14:hiddenLine xmlns:a14="http://schemas.microsoft.com/office/drawing/2010/main" xmlns="" w="9525">
+                  <a14:hiddenLine xmlns="" xmlns:a14="http://schemas.microsoft.com/office/drawing/2010/main" w="9525">
                     <a:solidFill>
                       <a:srgbClr val="000000"/>
                     </a:solidFill>
@@ -9940,7 +9949,7 @@
               </a:ln>
               <a:extLst>
                 <a:ext uri="{91240B29-F687-4f45-9708-019B960494DF}">
-                  <a14:hiddenLine xmlns:a14="http://schemas.microsoft.com/office/drawing/2010/main" xmlns="" w="9525">
+                  <a14:hiddenLine xmlns="" xmlns:a14="http://schemas.microsoft.com/office/drawing/2010/main" w="9525">
                     <a:solidFill>
                       <a:srgbClr val="000000"/>
                     </a:solidFill>
@@ -10030,7 +10039,7 @@
               </a:ln>
               <a:extLst>
                 <a:ext uri="{91240B29-F687-4f45-9708-019B960494DF}">
-                  <a14:hiddenLine xmlns:a14="http://schemas.microsoft.com/office/drawing/2010/main" xmlns="" w="9525">
+                  <a14:hiddenLine xmlns="" xmlns:a14="http://schemas.microsoft.com/office/drawing/2010/main" w="9525">
                     <a:solidFill>
                       <a:srgbClr val="000000"/>
                     </a:solidFill>
@@ -10120,7 +10129,7 @@
               </a:ln>
               <a:extLst>
                 <a:ext uri="{91240B29-F687-4f45-9708-019B960494DF}">
-                  <a14:hiddenLine xmlns:a14="http://schemas.microsoft.com/office/drawing/2010/main" xmlns="" w="9525">
+                  <a14:hiddenLine xmlns="" xmlns:a14="http://schemas.microsoft.com/office/drawing/2010/main" w="9525">
                     <a:solidFill>
                       <a:srgbClr val="000000"/>
                     </a:solidFill>
@@ -10182,7 +10191,7 @@
               </a:ln>
               <a:extLst>
                 <a:ext uri="{91240B29-F687-4f45-9708-019B960494DF}">
-                  <a14:hiddenLine xmlns:a14="http://schemas.microsoft.com/office/drawing/2010/main" xmlns="" w="9525">
+                  <a14:hiddenLine xmlns="" xmlns:a14="http://schemas.microsoft.com/office/drawing/2010/main" w="9525">
                     <a:solidFill>
                       <a:srgbClr val="000000"/>
                     </a:solidFill>
@@ -10292,7 +10301,7 @@
               </a:ln>
               <a:extLst>
                 <a:ext uri="{91240B29-F687-4f45-9708-019B960494DF}">
-                  <a14:hiddenLine xmlns:a14="http://schemas.microsoft.com/office/drawing/2010/main" xmlns="" w="9525">
+                  <a14:hiddenLine xmlns="" xmlns:a14="http://schemas.microsoft.com/office/drawing/2010/main" w="9525">
                     <a:solidFill>
                       <a:srgbClr val="000000"/>
                     </a:solidFill>
@@ -10376,7 +10385,7 @@
               </a:ln>
               <a:extLst>
                 <a:ext uri="{91240B29-F687-4f45-9708-019B960494DF}">
-                  <a14:hiddenLine xmlns:a14="http://schemas.microsoft.com/office/drawing/2010/main" xmlns="" w="9525">
+                  <a14:hiddenLine xmlns="" xmlns:a14="http://schemas.microsoft.com/office/drawing/2010/main" w="9525">
                     <a:solidFill>
                       <a:srgbClr val="000000"/>
                     </a:solidFill>
@@ -10438,7 +10447,7 @@
               </a:ln>
               <a:extLst>
                 <a:ext uri="{91240B29-F687-4f45-9708-019B960494DF}">
-                  <a14:hiddenLine xmlns:a14="http://schemas.microsoft.com/office/drawing/2010/main" xmlns="" w="9525">
+                  <a14:hiddenLine xmlns="" xmlns:a14="http://schemas.microsoft.com/office/drawing/2010/main" w="9525">
                     <a:solidFill>
                       <a:srgbClr val="000000"/>
                     </a:solidFill>
@@ -10500,7 +10509,7 @@
               </a:ln>
               <a:extLst>
                 <a:ext uri="{91240B29-F687-4f45-9708-019B960494DF}">
-                  <a14:hiddenLine xmlns:a14="http://schemas.microsoft.com/office/drawing/2010/main" xmlns="" w="9525">
+                  <a14:hiddenLine xmlns="" xmlns:a14="http://schemas.microsoft.com/office/drawing/2010/main" w="9525">
                     <a:solidFill>
                       <a:srgbClr val="000000"/>
                     </a:solidFill>
@@ -10590,7 +10599,7 @@
               </a:ln>
               <a:extLst>
                 <a:ext uri="{91240B29-F687-4f45-9708-019B960494DF}">
-                  <a14:hiddenLine xmlns:a14="http://schemas.microsoft.com/office/drawing/2010/main" xmlns="" w="9525">
+                  <a14:hiddenLine xmlns="" xmlns:a14="http://schemas.microsoft.com/office/drawing/2010/main" w="9525">
                     <a:solidFill>
                       <a:srgbClr val="000000"/>
                     </a:solidFill>
@@ -10624,7 +10633,7 @@
               </a:ln>
               <a:extLst>
                 <a:ext uri="{91240B29-F687-4f45-9708-019B960494DF}">
-                  <a14:hiddenLine xmlns:a14="http://schemas.microsoft.com/office/drawing/2010/main" xmlns="" w="9525">
+                  <a14:hiddenLine xmlns="" xmlns:a14="http://schemas.microsoft.com/office/drawing/2010/main" w="9525">
                     <a:solidFill>
                       <a:srgbClr val="000000"/>
                     </a:solidFill>
@@ -10689,7 +10698,7 @@
               </a:ln>
               <a:extLst>
                 <a:ext uri="{91240B29-F687-4f45-9708-019B960494DF}">
-                  <a14:hiddenLine xmlns:a14="http://schemas.microsoft.com/office/drawing/2010/main" xmlns="" w="9525">
+                  <a14:hiddenLine xmlns="" xmlns:a14="http://schemas.microsoft.com/office/drawing/2010/main" w="9525">
                     <a:solidFill>
                       <a:srgbClr val="000000"/>
                     </a:solidFill>
@@ -10779,7 +10788,7 @@
               </a:ln>
               <a:extLst>
                 <a:ext uri="{91240B29-F687-4f45-9708-019B960494DF}">
-                  <a14:hiddenLine xmlns:a14="http://schemas.microsoft.com/office/drawing/2010/main" xmlns="" w="9525">
+                  <a14:hiddenLine xmlns="" xmlns:a14="http://schemas.microsoft.com/office/drawing/2010/main" w="9525">
                     <a:solidFill>
                       <a:srgbClr val="000000"/>
                     </a:solidFill>
@@ -10841,7 +10850,7 @@
               </a:ln>
               <a:extLst>
                 <a:ext uri="{91240B29-F687-4f45-9708-019B960494DF}">
-                  <a14:hiddenLine xmlns:a14="http://schemas.microsoft.com/office/drawing/2010/main" xmlns="" w="9525">
+                  <a14:hiddenLine xmlns="" xmlns:a14="http://schemas.microsoft.com/office/drawing/2010/main" w="9525">
                     <a:solidFill>
                       <a:srgbClr val="000000"/>
                     </a:solidFill>
@@ -10931,7 +10940,7 @@
               </a:ln>
               <a:extLst>
                 <a:ext uri="{91240B29-F687-4f45-9708-019B960494DF}">
-                  <a14:hiddenLine xmlns:a14="http://schemas.microsoft.com/office/drawing/2010/main" xmlns="" w="9525">
+                  <a14:hiddenLine xmlns="" xmlns:a14="http://schemas.microsoft.com/office/drawing/2010/main" w="9525">
                     <a:solidFill>
                       <a:srgbClr val="000000"/>
                     </a:solidFill>
@@ -10996,7 +11005,7 @@
               </a:ln>
               <a:extLst>
                 <a:ext uri="{91240B29-F687-4f45-9708-019B960494DF}">
-                  <a14:hiddenLine xmlns:a14="http://schemas.microsoft.com/office/drawing/2010/main" xmlns="" w="9525">
+                  <a14:hiddenLine xmlns="" xmlns:a14="http://schemas.microsoft.com/office/drawing/2010/main" w="9525">
                     <a:solidFill>
                       <a:srgbClr val="000000"/>
                     </a:solidFill>
@@ -11058,7 +11067,7 @@
               </a:ln>
               <a:extLst>
                 <a:ext uri="{91240B29-F687-4f45-9708-019B960494DF}">
-                  <a14:hiddenLine xmlns:a14="http://schemas.microsoft.com/office/drawing/2010/main" xmlns="" w="9525">
+                  <a14:hiddenLine xmlns="" xmlns:a14="http://schemas.microsoft.com/office/drawing/2010/main" w="9525">
                     <a:solidFill>
                       <a:srgbClr val="000000"/>
                     </a:solidFill>
@@ -11148,7 +11157,7 @@
               </a:ln>
               <a:extLst>
                 <a:ext uri="{91240B29-F687-4f45-9708-019B960494DF}">
-                  <a14:hiddenLine xmlns:a14="http://schemas.microsoft.com/office/drawing/2010/main" xmlns="" w="9525">
+                  <a14:hiddenLine xmlns="" xmlns:a14="http://schemas.microsoft.com/office/drawing/2010/main" w="9525">
                     <a:solidFill>
                       <a:srgbClr val="000000"/>
                     </a:solidFill>
@@ -11238,7 +11247,7 @@
               </a:ln>
               <a:extLst>
                 <a:ext uri="{91240B29-F687-4f45-9708-019B960494DF}">
-                  <a14:hiddenLine xmlns:a14="http://schemas.microsoft.com/office/drawing/2010/main" xmlns="" w="9525">
+                  <a14:hiddenLine xmlns="" xmlns:a14="http://schemas.microsoft.com/office/drawing/2010/main" w="9525">
                     <a:solidFill>
                       <a:srgbClr val="000000"/>
                     </a:solidFill>
@@ -11303,7 +11312,7 @@
               </a:ln>
               <a:extLst>
                 <a:ext uri="{91240B29-F687-4f45-9708-019B960494DF}">
-                  <a14:hiddenLine xmlns:a14="http://schemas.microsoft.com/office/drawing/2010/main" xmlns="" w="9525">
+                  <a14:hiddenLine xmlns="" xmlns:a14="http://schemas.microsoft.com/office/drawing/2010/main" w="9525">
                     <a:solidFill>
                       <a:srgbClr val="000000"/>
                     </a:solidFill>
@@ -11423,7 +11432,7 @@
               </a:ln>
               <a:extLst>
                 <a:ext uri="{91240B29-F687-4f45-9708-019B960494DF}">
-                  <a14:hiddenLine xmlns:a14="http://schemas.microsoft.com/office/drawing/2010/main" xmlns="" w="9525">
+                  <a14:hiddenLine xmlns="" xmlns:a14="http://schemas.microsoft.com/office/drawing/2010/main" w="9525">
                     <a:solidFill>
                       <a:srgbClr val="000000"/>
                     </a:solidFill>
@@ -11521,7 +11530,7 @@
               </a:ln>
               <a:extLst>
                 <a:ext uri="{91240B29-F687-4f45-9708-019B960494DF}">
-                  <a14:hiddenLine xmlns:a14="http://schemas.microsoft.com/office/drawing/2010/main" xmlns="" w="9525">
+                  <a14:hiddenLine xmlns="" xmlns:a14="http://schemas.microsoft.com/office/drawing/2010/main" w="9525">
                     <a:solidFill>
                       <a:srgbClr val="000000"/>
                     </a:solidFill>
@@ -11636,7 +11645,7 @@
               </a:ln>
               <a:extLst>
                 <a:ext uri="{91240B29-F687-4f45-9708-019B960494DF}">
-                  <a14:hiddenLine xmlns:a14="http://schemas.microsoft.com/office/drawing/2010/main" xmlns="" w="9525">
+                  <a14:hiddenLine xmlns="" xmlns:a14="http://schemas.microsoft.com/office/drawing/2010/main" w="9525">
                     <a:solidFill>
                       <a:srgbClr val="000000"/>
                     </a:solidFill>
@@ -11726,7 +11735,7 @@
               </a:ln>
               <a:extLst>
                 <a:ext uri="{91240B29-F687-4f45-9708-019B960494DF}">
-                  <a14:hiddenLine xmlns:a14="http://schemas.microsoft.com/office/drawing/2010/main" xmlns="" w="9525">
+                  <a14:hiddenLine xmlns="" xmlns:a14="http://schemas.microsoft.com/office/drawing/2010/main" w="9525">
                     <a:solidFill>
                       <a:srgbClr val="000000"/>
                     </a:solidFill>
@@ -11791,7 +11800,7 @@
               </a:ln>
               <a:extLst>
                 <a:ext uri="{91240B29-F687-4f45-9708-019B960494DF}">
-                  <a14:hiddenLine xmlns:a14="http://schemas.microsoft.com/office/drawing/2010/main" xmlns="" w="9525">
+                  <a14:hiddenLine xmlns="" xmlns:a14="http://schemas.microsoft.com/office/drawing/2010/main" w="9525">
                     <a:solidFill>
                       <a:srgbClr val="000000"/>
                     </a:solidFill>
@@ -11881,7 +11890,7 @@
               </a:ln>
               <a:extLst>
                 <a:ext uri="{91240B29-F687-4f45-9708-019B960494DF}">
-                  <a14:hiddenLine xmlns:a14="http://schemas.microsoft.com/office/drawing/2010/main" xmlns="" w="9525">
+                  <a14:hiddenLine xmlns="" xmlns:a14="http://schemas.microsoft.com/office/drawing/2010/main" w="9525">
                     <a:solidFill>
                       <a:srgbClr val="000000"/>
                     </a:solidFill>
@@ -11949,7 +11958,7 @@
               </a:ln>
               <a:extLst>
                 <a:ext uri="{91240B29-F687-4f45-9708-019B960494DF}">
-                  <a14:hiddenLine xmlns:a14="http://schemas.microsoft.com/office/drawing/2010/main" xmlns="" w="9525">
+                  <a14:hiddenLine xmlns="" xmlns:a14="http://schemas.microsoft.com/office/drawing/2010/main" w="9525">
                     <a:solidFill>
                       <a:srgbClr val="000000"/>
                     </a:solidFill>
@@ -12039,7 +12048,7 @@
               </a:ln>
               <a:extLst>
                 <a:ext uri="{91240B29-F687-4f45-9708-019B960494DF}">
-                  <a14:hiddenLine xmlns:a14="http://schemas.microsoft.com/office/drawing/2010/main" xmlns="" w="9525">
+                  <a14:hiddenLine xmlns="" xmlns:a14="http://schemas.microsoft.com/office/drawing/2010/main" w="9525">
                     <a:solidFill>
                       <a:srgbClr val="000000"/>
                     </a:solidFill>
@@ -12107,7 +12116,7 @@
               </a:ln>
               <a:extLst>
                 <a:ext uri="{91240B29-F687-4f45-9708-019B960494DF}">
-                  <a14:hiddenLine xmlns:a14="http://schemas.microsoft.com/office/drawing/2010/main" xmlns="" w="9525">
+                  <a14:hiddenLine xmlns="" xmlns:a14="http://schemas.microsoft.com/office/drawing/2010/main" w="9525">
                     <a:solidFill>
                       <a:srgbClr val="000000"/>
                     </a:solidFill>
@@ -12197,7 +12206,7 @@
               </a:ln>
               <a:extLst>
                 <a:ext uri="{91240B29-F687-4f45-9708-019B960494DF}">
-                  <a14:hiddenLine xmlns:a14="http://schemas.microsoft.com/office/drawing/2010/main" xmlns="" w="9525">
+                  <a14:hiddenLine xmlns="" xmlns:a14="http://schemas.microsoft.com/office/drawing/2010/main" w="9525">
                     <a:solidFill>
                       <a:srgbClr val="000000"/>
                     </a:solidFill>
@@ -12231,7 +12240,7 @@
               </a:ln>
               <a:extLst>
                 <a:ext uri="{91240B29-F687-4f45-9708-019B960494DF}">
-                  <a14:hiddenLine xmlns:a14="http://schemas.microsoft.com/office/drawing/2010/main" xmlns="" w="9525">
+                  <a14:hiddenLine xmlns="" xmlns:a14="http://schemas.microsoft.com/office/drawing/2010/main" w="9525">
                     <a:solidFill>
                       <a:srgbClr val="000000"/>
                     </a:solidFill>
@@ -12861,6 +12870,346 @@
 </p:sld>
 </file>
 
+<file path=ppt/slides/slide10.xml><?xml version="1.0" encoding="utf-8"?>
+<p:sld xmlns:a="http://schemas.openxmlformats.org/drawingml/2006/main" xmlns:r="http://schemas.openxmlformats.org/officeDocument/2006/relationships" xmlns:p="http://schemas.openxmlformats.org/presentationml/2006/main">
+  <p:cSld>
+    <p:spTree>
+      <p:nvGrpSpPr>
+        <p:cNvPr id="1" name=""/>
+        <p:cNvGrpSpPr/>
+        <p:nvPr/>
+      </p:nvGrpSpPr>
+      <p:grpSpPr>
+        <a:xfrm>
+          <a:off x="0" y="0"/>
+          <a:ext cx="0" cy="0"/>
+          <a:chOff x="0" y="0"/>
+          <a:chExt cx="0" cy="0"/>
+        </a:xfrm>
+      </p:grpSpPr>
+      <p:sp>
+        <p:nvSpPr>
+          <p:cNvPr id="2" name="Titel 1">
+            <a:extLst>
+              <a:ext uri="{FF2B5EF4-FFF2-40B4-BE49-F238E27FC236}">
+                <a16:creationId xmlns:a16="http://schemas.microsoft.com/office/drawing/2014/main" id="{1C379F61-BCEA-496B-995A-3B4C7DB56E6E}"/>
+              </a:ext>
+            </a:extLst>
+          </p:cNvPr>
+          <p:cNvSpPr>
+            <a:spLocks noGrp="1"/>
+          </p:cNvSpPr>
+          <p:nvPr>
+            <p:ph type="title"/>
+          </p:nvPr>
+        </p:nvSpPr>
+        <p:spPr/>
+        <p:txBody>
+          <a:bodyPr/>
+          <a:lstStyle/>
+          <a:p>
+            <a:r>
+              <a:rPr lang="de-DE" dirty="0"/>
+              <a:t>Vorführung Projektstand</a:t>
+            </a:r>
+          </a:p>
+        </p:txBody>
+      </p:sp>
+      <p:sp>
+        <p:nvSpPr>
+          <p:cNvPr id="3" name="Inhaltsplatzhalter 2">
+            <a:extLst>
+              <a:ext uri="{FF2B5EF4-FFF2-40B4-BE49-F238E27FC236}">
+                <a16:creationId xmlns:a16="http://schemas.microsoft.com/office/drawing/2014/main" id="{D22270B8-41F5-470C-B4EE-8587859F517A}"/>
+              </a:ext>
+            </a:extLst>
+          </p:cNvPr>
+          <p:cNvSpPr>
+            <a:spLocks noGrp="1"/>
+          </p:cNvSpPr>
+          <p:nvPr>
+            <p:ph idx="1"/>
+          </p:nvPr>
+        </p:nvSpPr>
+        <p:spPr/>
+        <p:txBody>
+          <a:bodyPr/>
+          <a:lstStyle/>
+          <a:p>
+            <a:endParaRPr lang="de-DE"/>
+          </a:p>
+        </p:txBody>
+      </p:sp>
+      <p:sp>
+        <p:nvSpPr>
+          <p:cNvPr id="4" name="Datumsplatzhalter 3">
+            <a:extLst>
+              <a:ext uri="{FF2B5EF4-FFF2-40B4-BE49-F238E27FC236}">
+                <a16:creationId xmlns:a16="http://schemas.microsoft.com/office/drawing/2014/main" id="{E0DA990B-59DC-46D5-ACD5-7DE03A5DC6DA}"/>
+              </a:ext>
+            </a:extLst>
+          </p:cNvPr>
+          <p:cNvSpPr>
+            <a:spLocks noGrp="1"/>
+          </p:cNvSpPr>
+          <p:nvPr>
+            <p:ph type="dt" sz="half" idx="10"/>
+          </p:nvPr>
+        </p:nvSpPr>
+        <p:spPr/>
+        <p:txBody>
+          <a:bodyPr/>
+          <a:lstStyle/>
+          <a:p>
+            <a:fld id="{E1D1844E-27EB-425F-8EA3-7C4C4F30C79E}" type="datetime1">
+              <a:rPr lang="de-DE" smtClean="0"/>
+              <a:t>03.12.2018</a:t>
+            </a:fld>
+            <a:endParaRPr lang="en-US" dirty="0"/>
+          </a:p>
+        </p:txBody>
+      </p:sp>
+      <p:sp>
+        <p:nvSpPr>
+          <p:cNvPr id="5" name="Fußzeilenplatzhalter 4">
+            <a:extLst>
+              <a:ext uri="{FF2B5EF4-FFF2-40B4-BE49-F238E27FC236}">
+                <a16:creationId xmlns:a16="http://schemas.microsoft.com/office/drawing/2014/main" id="{CB34AA42-14F1-4DAA-8526-0ADDB91776EA}"/>
+              </a:ext>
+            </a:extLst>
+          </p:cNvPr>
+          <p:cNvSpPr>
+            <a:spLocks noGrp="1"/>
+          </p:cNvSpPr>
+          <p:nvPr>
+            <p:ph type="ftr" sz="quarter" idx="11"/>
+          </p:nvPr>
+        </p:nvSpPr>
+        <p:spPr/>
+        <p:txBody>
+          <a:bodyPr/>
+          <a:lstStyle/>
+          <a:p>
+            <a:r>
+              <a:rPr lang="de-DE"/>
+              <a:t>Bosin, Espig, Lauenroth, Siefert, Techel</a:t>
+            </a:r>
+            <a:endParaRPr lang="en-US" dirty="0"/>
+          </a:p>
+        </p:txBody>
+      </p:sp>
+      <p:sp>
+        <p:nvSpPr>
+          <p:cNvPr id="6" name="Foliennummernplatzhalter 5">
+            <a:extLst>
+              <a:ext uri="{FF2B5EF4-FFF2-40B4-BE49-F238E27FC236}">
+                <a16:creationId xmlns:a16="http://schemas.microsoft.com/office/drawing/2014/main" id="{89613E97-9FFE-427F-8BC3-F0DE82C5149A}"/>
+              </a:ext>
+            </a:extLst>
+          </p:cNvPr>
+          <p:cNvSpPr>
+            <a:spLocks noGrp="1"/>
+          </p:cNvSpPr>
+          <p:nvPr>
+            <p:ph type="sldNum" sz="quarter" idx="12"/>
+          </p:nvPr>
+        </p:nvSpPr>
+        <p:spPr/>
+        <p:txBody>
+          <a:bodyPr/>
+          <a:lstStyle/>
+          <a:p>
+            <a:fld id="{6D22F896-40B5-4ADD-8801-0D06FADFA095}" type="slidenum">
+              <a:rPr lang="en-US" smtClean="0"/>
+              <a:t>10</a:t>
+            </a:fld>
+            <a:endParaRPr lang="en-US" dirty="0"/>
+          </a:p>
+        </p:txBody>
+      </p:sp>
+    </p:spTree>
+    <p:extLst>
+      <p:ext uri="{BB962C8B-B14F-4D97-AF65-F5344CB8AC3E}">
+        <p14:creationId xmlns:p14="http://schemas.microsoft.com/office/powerpoint/2010/main" val="3231929460"/>
+      </p:ext>
+    </p:extLst>
+  </p:cSld>
+  <p:clrMapOvr>
+    <a:masterClrMapping/>
+  </p:clrMapOvr>
+</p:sld>
+</file>
+
+<file path=ppt/slides/slide11.xml><?xml version="1.0" encoding="utf-8"?>
+<p:sld xmlns:a="http://schemas.openxmlformats.org/drawingml/2006/main" xmlns:r="http://schemas.openxmlformats.org/officeDocument/2006/relationships" xmlns:p="http://schemas.openxmlformats.org/presentationml/2006/main">
+  <p:cSld>
+    <p:spTree>
+      <p:nvGrpSpPr>
+        <p:cNvPr id="1" name=""/>
+        <p:cNvGrpSpPr/>
+        <p:nvPr/>
+      </p:nvGrpSpPr>
+      <p:grpSpPr>
+        <a:xfrm>
+          <a:off x="0" y="0"/>
+          <a:ext cx="0" cy="0"/>
+          <a:chOff x="0" y="0"/>
+          <a:chExt cx="0" cy="0"/>
+        </a:xfrm>
+      </p:grpSpPr>
+      <p:sp>
+        <p:nvSpPr>
+          <p:cNvPr id="2" name="Titel 1">
+            <a:extLst>
+              <a:ext uri="{FF2B5EF4-FFF2-40B4-BE49-F238E27FC236}">
+                <a16:creationId xmlns:a16="http://schemas.microsoft.com/office/drawing/2014/main" id="{03FD57A2-14B8-4EE4-A02B-29DEF1978A65}"/>
+              </a:ext>
+            </a:extLst>
+          </p:cNvPr>
+          <p:cNvSpPr>
+            <a:spLocks noGrp="1"/>
+          </p:cNvSpPr>
+          <p:nvPr>
+            <p:ph type="title"/>
+          </p:nvPr>
+        </p:nvSpPr>
+        <p:spPr/>
+        <p:txBody>
+          <a:bodyPr/>
+          <a:lstStyle/>
+          <a:p>
+            <a:r>
+              <a:rPr lang="de-DE" dirty="0"/>
+              <a:t>Eigene Eindrücke</a:t>
+            </a:r>
+          </a:p>
+        </p:txBody>
+      </p:sp>
+      <p:sp>
+        <p:nvSpPr>
+          <p:cNvPr id="3" name="Inhaltsplatzhalter 2">
+            <a:extLst>
+              <a:ext uri="{FF2B5EF4-FFF2-40B4-BE49-F238E27FC236}">
+                <a16:creationId xmlns:a16="http://schemas.microsoft.com/office/drawing/2014/main" id="{A72392CE-DCDF-4855-9E88-365021A93C6C}"/>
+              </a:ext>
+            </a:extLst>
+          </p:cNvPr>
+          <p:cNvSpPr>
+            <a:spLocks noGrp="1"/>
+          </p:cNvSpPr>
+          <p:nvPr>
+            <p:ph idx="1"/>
+          </p:nvPr>
+        </p:nvSpPr>
+        <p:spPr/>
+        <p:txBody>
+          <a:bodyPr/>
+          <a:lstStyle/>
+          <a:p>
+            <a:endParaRPr lang="de-DE" dirty="0"/>
+          </a:p>
+        </p:txBody>
+      </p:sp>
+      <p:sp>
+        <p:nvSpPr>
+          <p:cNvPr id="4" name="Datumsplatzhalter 3">
+            <a:extLst>
+              <a:ext uri="{FF2B5EF4-FFF2-40B4-BE49-F238E27FC236}">
+                <a16:creationId xmlns:a16="http://schemas.microsoft.com/office/drawing/2014/main" id="{AAC72671-405C-4324-8617-159D7E4B4144}"/>
+              </a:ext>
+            </a:extLst>
+          </p:cNvPr>
+          <p:cNvSpPr>
+            <a:spLocks noGrp="1"/>
+          </p:cNvSpPr>
+          <p:nvPr>
+            <p:ph type="dt" sz="half" idx="10"/>
+          </p:nvPr>
+        </p:nvSpPr>
+        <p:spPr/>
+        <p:txBody>
+          <a:bodyPr/>
+          <a:lstStyle/>
+          <a:p>
+            <a:fld id="{AEE2B4A9-8F5E-4B84-8661-FDAE7821C466}" type="datetime1">
+              <a:rPr lang="de-DE" smtClean="0"/>
+              <a:t>03.12.2018</a:t>
+            </a:fld>
+            <a:endParaRPr lang="en-US" dirty="0"/>
+          </a:p>
+        </p:txBody>
+      </p:sp>
+      <p:sp>
+        <p:nvSpPr>
+          <p:cNvPr id="5" name="Fußzeilenplatzhalter 4">
+            <a:extLst>
+              <a:ext uri="{FF2B5EF4-FFF2-40B4-BE49-F238E27FC236}">
+                <a16:creationId xmlns:a16="http://schemas.microsoft.com/office/drawing/2014/main" id="{B32BF021-8C3F-4D6C-9960-69040C7827C0}"/>
+              </a:ext>
+            </a:extLst>
+          </p:cNvPr>
+          <p:cNvSpPr>
+            <a:spLocks noGrp="1"/>
+          </p:cNvSpPr>
+          <p:nvPr>
+            <p:ph type="ftr" sz="quarter" idx="11"/>
+          </p:nvPr>
+        </p:nvSpPr>
+        <p:spPr/>
+        <p:txBody>
+          <a:bodyPr/>
+          <a:lstStyle/>
+          <a:p>
+            <a:r>
+              <a:rPr lang="de-DE" dirty="0"/>
+              <a:t>Bosin, Espig, Lauenroth, Siefert, Techel</a:t>
+            </a:r>
+            <a:endParaRPr lang="en-US" dirty="0"/>
+          </a:p>
+        </p:txBody>
+      </p:sp>
+      <p:sp>
+        <p:nvSpPr>
+          <p:cNvPr id="6" name="Foliennummernplatzhalter 5">
+            <a:extLst>
+              <a:ext uri="{FF2B5EF4-FFF2-40B4-BE49-F238E27FC236}">
+                <a16:creationId xmlns:a16="http://schemas.microsoft.com/office/drawing/2014/main" id="{4F7659D2-FB7D-437D-AB9C-CF2D17066A96}"/>
+              </a:ext>
+            </a:extLst>
+          </p:cNvPr>
+          <p:cNvSpPr>
+            <a:spLocks noGrp="1"/>
+          </p:cNvSpPr>
+          <p:nvPr>
+            <p:ph type="sldNum" sz="quarter" idx="12"/>
+          </p:nvPr>
+        </p:nvSpPr>
+        <p:spPr/>
+        <p:txBody>
+          <a:bodyPr/>
+          <a:lstStyle/>
+          <a:p>
+            <a:fld id="{6D22F896-40B5-4ADD-8801-0D06FADFA095}" type="slidenum">
+              <a:rPr lang="en-US" smtClean="0"/>
+              <a:t>11</a:t>
+            </a:fld>
+            <a:endParaRPr lang="en-US" dirty="0"/>
+          </a:p>
+        </p:txBody>
+      </p:sp>
+    </p:spTree>
+    <p:extLst>
+      <p:ext uri="{BB962C8B-B14F-4D97-AF65-F5344CB8AC3E}">
+        <p14:creationId xmlns:p14="http://schemas.microsoft.com/office/powerpoint/2010/main" val="1140022867"/>
+      </p:ext>
+    </p:extLst>
+  </p:cSld>
+  <p:clrMapOvr>
+    <a:masterClrMapping/>
+  </p:clrMapOvr>
+</p:sld>
+</file>
+
 <file path=ppt/slides/slide2.xml><?xml version="1.0" encoding="utf-8"?>
 <p:sld xmlns:a="http://schemas.openxmlformats.org/drawingml/2006/main" xmlns:r="http://schemas.openxmlformats.org/officeDocument/2006/relationships" xmlns:p="http://schemas.openxmlformats.org/presentationml/2006/main">
   <p:cSld>
@@ -12947,14 +13296,13 @@
           <a:p>
             <a:r>
               <a:rPr lang="de-DE" dirty="0"/>
-              <a:t>Vorführung Projektstand (Spieler anmelden)</a:t>
+              <a:t>Vorführung Projektstand (Spieler anmelden</a:t>
             </a:r>
-          </a:p>
-          <a:p>
             <a:r>
-              <a:rPr lang="de-DE" dirty="0"/>
-              <a:t>Testprotokolle</a:t>
+              <a:rPr lang="de-DE" dirty="0" smtClean="0"/>
+              <a:t>)</a:t>
             </a:r>
+            <a:endParaRPr lang="de-DE" dirty="0"/>
           </a:p>
           <a:p>
             <a:r>
@@ -13305,7 +13653,30 @@
           <a:bodyPr/>
           <a:lstStyle/>
           <a:p>
-            <a:endParaRPr lang="de-DE"/>
+            <a:r>
+              <a:rPr lang="de-DE" dirty="0" smtClean="0"/>
+              <a:t>Anforderungsspezifikation</a:t>
+            </a:r>
+          </a:p>
+          <a:p>
+            <a:r>
+              <a:rPr lang="de-DE" dirty="0" smtClean="0"/>
+              <a:t>Fachliches Datenmodell</a:t>
+            </a:r>
+            <a:endParaRPr lang="de-DE" dirty="0"/>
+          </a:p>
+          <a:p>
+            <a:r>
+              <a:rPr lang="de-DE" dirty="0" smtClean="0"/>
+              <a:t>Architekturdokument</a:t>
+            </a:r>
+          </a:p>
+          <a:p>
+            <a:r>
+              <a:rPr lang="de-DE" dirty="0" smtClean="0"/>
+              <a:t>Testprotokolle</a:t>
+            </a:r>
+            <a:endParaRPr lang="de-DE" dirty="0"/>
           </a:p>
         </p:txBody>
       </p:sp>
@@ -13428,13 +13799,7 @@
       </p:grpSpPr>
       <p:sp>
         <p:nvSpPr>
-          <p:cNvPr id="2" name="Titel 1">
-            <a:extLst>
-              <a:ext uri="{FF2B5EF4-FFF2-40B4-BE49-F238E27FC236}">
-                <a16:creationId xmlns:a16="http://schemas.microsoft.com/office/drawing/2014/main" id="{88B74F27-9CBE-419F-A429-4D948C81C3BB}"/>
-              </a:ext>
-            </a:extLst>
-          </p:cNvPr>
+          <p:cNvPr id="2" name="Titel 1"/>
           <p:cNvSpPr>
             <a:spLocks noGrp="1"/>
           </p:cNvSpPr>
@@ -13448,21 +13813,16 @@
           <a:lstStyle/>
           <a:p>
             <a:r>
-              <a:rPr lang="de-DE" dirty="0"/>
-              <a:t>Projektstand</a:t>
+              <a:rPr lang="de-DE" dirty="0" smtClean="0"/>
+              <a:t>Anforderungsspezifikation</a:t>
             </a:r>
-          </a:p>
-        </p:txBody>
-      </p:sp>
-      <p:sp>
-        <p:nvSpPr>
-          <p:cNvPr id="3" name="Inhaltsplatzhalter 2">
-            <a:extLst>
-              <a:ext uri="{FF2B5EF4-FFF2-40B4-BE49-F238E27FC236}">
-                <a16:creationId xmlns:a16="http://schemas.microsoft.com/office/drawing/2014/main" id="{998602D6-0B61-45AF-B8CF-37D49DF8F6B0}"/>
-              </a:ext>
-            </a:extLst>
-          </p:cNvPr>
+            <a:endParaRPr lang="de-DE" dirty="0"/>
+          </a:p>
+        </p:txBody>
+      </p:sp>
+      <p:sp>
+        <p:nvSpPr>
+          <p:cNvPr id="3" name="Inhaltsplatzhalter 2"/>
           <p:cNvSpPr>
             <a:spLocks noGrp="1"/>
           </p:cNvSpPr>
@@ -13481,13 +13841,7 @@
       </p:sp>
       <p:sp>
         <p:nvSpPr>
-          <p:cNvPr id="4" name="Datumsplatzhalter 3">
-            <a:extLst>
-              <a:ext uri="{FF2B5EF4-FFF2-40B4-BE49-F238E27FC236}">
-                <a16:creationId xmlns:a16="http://schemas.microsoft.com/office/drawing/2014/main" id="{17CA8981-94D5-466D-86BA-414D50D3DA3C}"/>
-              </a:ext>
-            </a:extLst>
-          </p:cNvPr>
+          <p:cNvPr id="4" name="Datumsplatzhalter 3"/>
           <p:cNvSpPr>
             <a:spLocks noGrp="1"/>
           </p:cNvSpPr>
@@ -13500,7 +13854,7 @@
           <a:bodyPr/>
           <a:lstStyle/>
           <a:p>
-            <a:fld id="{5D7886D7-8107-45E6-97F3-CCD9494AACB9}" type="datetime1">
+            <a:fld id="{FF78DB55-C754-4AB2-B9F1-CF00D12F7BCC}" type="datetime1">
               <a:rPr lang="de-DE" smtClean="0"/>
               <a:t>03.12.2018</a:t>
             </a:fld>
@@ -13510,13 +13864,7 @@
       </p:sp>
       <p:sp>
         <p:nvSpPr>
-          <p:cNvPr id="5" name="Fußzeilenplatzhalter 4">
-            <a:extLst>
-              <a:ext uri="{FF2B5EF4-FFF2-40B4-BE49-F238E27FC236}">
-                <a16:creationId xmlns:a16="http://schemas.microsoft.com/office/drawing/2014/main" id="{51CD46FE-E2F8-4F36-9798-EA2C0B431472}"/>
-              </a:ext>
-            </a:extLst>
-          </p:cNvPr>
+          <p:cNvPr id="5" name="Fußzeilenplatzhalter 4"/>
           <p:cNvSpPr>
             <a:spLocks noGrp="1"/>
           </p:cNvSpPr>
@@ -13530,7 +13878,7 @@
           <a:lstStyle/>
           <a:p>
             <a:r>
-              <a:rPr lang="de-DE"/>
+              <a:rPr lang="de-DE" smtClean="0"/>
               <a:t>Bosin, Espig, Lauenroth, Siefert, Techel</a:t>
             </a:r>
             <a:endParaRPr lang="en-US" dirty="0"/>
@@ -13539,13 +13887,7 @@
       </p:sp>
       <p:sp>
         <p:nvSpPr>
-          <p:cNvPr id="6" name="Foliennummernplatzhalter 5">
-            <a:extLst>
-              <a:ext uri="{FF2B5EF4-FFF2-40B4-BE49-F238E27FC236}">
-                <a16:creationId xmlns:a16="http://schemas.microsoft.com/office/drawing/2014/main" id="{BE6718E8-5376-4C31-96DF-487D1C462FC1}"/>
-              </a:ext>
-            </a:extLst>
-          </p:cNvPr>
+          <p:cNvPr id="6" name="Foliennummernplatzhalter 5"/>
           <p:cNvSpPr>
             <a:spLocks noGrp="1"/>
           </p:cNvSpPr>
@@ -13569,7 +13911,7 @@
     </p:spTree>
     <p:extLst>
       <p:ext uri="{BB962C8B-B14F-4D97-AF65-F5344CB8AC3E}">
-        <p14:creationId xmlns:p14="http://schemas.microsoft.com/office/powerpoint/2010/main" val="1130107068"/>
+        <p14:creationId xmlns:p14="http://schemas.microsoft.com/office/powerpoint/2010/main" val="3187139348"/>
       </p:ext>
     </p:extLst>
   </p:cSld>
@@ -13598,13 +13940,7 @@
       </p:grpSpPr>
       <p:sp>
         <p:nvSpPr>
-          <p:cNvPr id="2" name="Titel 1">
-            <a:extLst>
-              <a:ext uri="{FF2B5EF4-FFF2-40B4-BE49-F238E27FC236}">
-                <a16:creationId xmlns:a16="http://schemas.microsoft.com/office/drawing/2014/main" id="{1C379F61-BCEA-496B-995A-3B4C7DB56E6E}"/>
-              </a:ext>
-            </a:extLst>
-          </p:cNvPr>
+          <p:cNvPr id="2" name="Titel 1"/>
           <p:cNvSpPr>
             <a:spLocks noGrp="1"/>
           </p:cNvSpPr>
@@ -13618,21 +13954,20 @@
           <a:lstStyle/>
           <a:p>
             <a:r>
-              <a:rPr lang="de-DE" dirty="0"/>
-              <a:t>Vorführung Projektstand</a:t>
+              <a:rPr lang="de-DE" dirty="0" smtClean="0"/>
+              <a:t>Fachliches </a:t>
             </a:r>
-          </a:p>
-        </p:txBody>
-      </p:sp>
-      <p:sp>
-        <p:nvSpPr>
-          <p:cNvPr id="3" name="Inhaltsplatzhalter 2">
-            <a:extLst>
-              <a:ext uri="{FF2B5EF4-FFF2-40B4-BE49-F238E27FC236}">
-                <a16:creationId xmlns:a16="http://schemas.microsoft.com/office/drawing/2014/main" id="{D22270B8-41F5-470C-B4EE-8587859F517A}"/>
-              </a:ext>
-            </a:extLst>
-          </p:cNvPr>
+            <a:r>
+              <a:rPr lang="de-DE" dirty="0" err="1" smtClean="0"/>
+              <a:t>DatenModell</a:t>
+            </a:r>
+            <a:endParaRPr lang="de-DE" dirty="0"/>
+          </a:p>
+        </p:txBody>
+      </p:sp>
+      <p:sp>
+        <p:nvSpPr>
+          <p:cNvPr id="3" name="Inhaltsplatzhalter 2"/>
           <p:cNvSpPr>
             <a:spLocks noGrp="1"/>
           </p:cNvSpPr>
@@ -13651,13 +13986,7 @@
       </p:sp>
       <p:sp>
         <p:nvSpPr>
-          <p:cNvPr id="4" name="Datumsplatzhalter 3">
-            <a:extLst>
-              <a:ext uri="{FF2B5EF4-FFF2-40B4-BE49-F238E27FC236}">
-                <a16:creationId xmlns:a16="http://schemas.microsoft.com/office/drawing/2014/main" id="{E0DA990B-59DC-46D5-ACD5-7DE03A5DC6DA}"/>
-              </a:ext>
-            </a:extLst>
-          </p:cNvPr>
+          <p:cNvPr id="4" name="Datumsplatzhalter 3"/>
           <p:cNvSpPr>
             <a:spLocks noGrp="1"/>
           </p:cNvSpPr>
@@ -13670,7 +13999,7 @@
           <a:bodyPr/>
           <a:lstStyle/>
           <a:p>
-            <a:fld id="{E1D1844E-27EB-425F-8EA3-7C4C4F30C79E}" type="datetime1">
+            <a:fld id="{FF78DB55-C754-4AB2-B9F1-CF00D12F7BCC}" type="datetime1">
               <a:rPr lang="de-DE" smtClean="0"/>
               <a:t>03.12.2018</a:t>
             </a:fld>
@@ -13680,13 +14009,7 @@
       </p:sp>
       <p:sp>
         <p:nvSpPr>
-          <p:cNvPr id="5" name="Fußzeilenplatzhalter 4">
-            <a:extLst>
-              <a:ext uri="{FF2B5EF4-FFF2-40B4-BE49-F238E27FC236}">
-                <a16:creationId xmlns:a16="http://schemas.microsoft.com/office/drawing/2014/main" id="{CB34AA42-14F1-4DAA-8526-0ADDB91776EA}"/>
-              </a:ext>
-            </a:extLst>
-          </p:cNvPr>
+          <p:cNvPr id="5" name="Fußzeilenplatzhalter 4"/>
           <p:cNvSpPr>
             <a:spLocks noGrp="1"/>
           </p:cNvSpPr>
@@ -13700,7 +14023,7 @@
           <a:lstStyle/>
           <a:p>
             <a:r>
-              <a:rPr lang="de-DE"/>
+              <a:rPr lang="de-DE" smtClean="0"/>
               <a:t>Bosin, Espig, Lauenroth, Siefert, Techel</a:t>
             </a:r>
             <a:endParaRPr lang="en-US" dirty="0"/>
@@ -13709,13 +14032,7 @@
       </p:sp>
       <p:sp>
         <p:nvSpPr>
-          <p:cNvPr id="6" name="Foliennummernplatzhalter 5">
-            <a:extLst>
-              <a:ext uri="{FF2B5EF4-FFF2-40B4-BE49-F238E27FC236}">
-                <a16:creationId xmlns:a16="http://schemas.microsoft.com/office/drawing/2014/main" id="{89613E97-9FFE-427F-8BC3-F0DE82C5149A}"/>
-              </a:ext>
-            </a:extLst>
-          </p:cNvPr>
+          <p:cNvPr id="6" name="Foliennummernplatzhalter 5"/>
           <p:cNvSpPr>
             <a:spLocks noGrp="1"/>
           </p:cNvSpPr>
@@ -13739,7 +14056,7 @@
     </p:spTree>
     <p:extLst>
       <p:ext uri="{BB962C8B-B14F-4D97-AF65-F5344CB8AC3E}">
-        <p14:creationId xmlns:p14="http://schemas.microsoft.com/office/powerpoint/2010/main" val="3231929460"/>
+        <p14:creationId xmlns:p14="http://schemas.microsoft.com/office/powerpoint/2010/main" val="2253824735"/>
       </p:ext>
     </p:extLst>
   </p:cSld>
@@ -13768,13 +14085,7 @@
       </p:grpSpPr>
       <p:sp>
         <p:nvSpPr>
-          <p:cNvPr id="2" name="Titel 1">
-            <a:extLst>
-              <a:ext uri="{FF2B5EF4-FFF2-40B4-BE49-F238E27FC236}">
-                <a16:creationId xmlns:a16="http://schemas.microsoft.com/office/drawing/2014/main" id="{B4D152A1-CE8D-4C1A-96EF-E089FC846801}"/>
-              </a:ext>
-            </a:extLst>
-          </p:cNvPr>
+          <p:cNvPr id="2" name="Titel 1"/>
           <p:cNvSpPr>
             <a:spLocks noGrp="1"/>
           </p:cNvSpPr>
@@ -13788,21 +14099,16 @@
           <a:lstStyle/>
           <a:p>
             <a:r>
-              <a:rPr lang="de-DE" dirty="0"/>
-              <a:t>Testprotokolle</a:t>
+              <a:rPr lang="de-DE" dirty="0" smtClean="0"/>
+              <a:t>Architekturdokument</a:t>
             </a:r>
-          </a:p>
-        </p:txBody>
-      </p:sp>
-      <p:sp>
-        <p:nvSpPr>
-          <p:cNvPr id="3" name="Inhaltsplatzhalter 2">
-            <a:extLst>
-              <a:ext uri="{FF2B5EF4-FFF2-40B4-BE49-F238E27FC236}">
-                <a16:creationId xmlns:a16="http://schemas.microsoft.com/office/drawing/2014/main" id="{021ECC26-7F01-4244-894E-634DF134F600}"/>
-              </a:ext>
-            </a:extLst>
-          </p:cNvPr>
+            <a:endParaRPr lang="de-DE" dirty="0"/>
+          </a:p>
+        </p:txBody>
+      </p:sp>
+      <p:sp>
+        <p:nvSpPr>
+          <p:cNvPr id="3" name="Inhaltsplatzhalter 2"/>
           <p:cNvSpPr>
             <a:spLocks noGrp="1"/>
           </p:cNvSpPr>
@@ -13821,13 +14127,7 @@
       </p:sp>
       <p:sp>
         <p:nvSpPr>
-          <p:cNvPr id="4" name="Datumsplatzhalter 3">
-            <a:extLst>
-              <a:ext uri="{FF2B5EF4-FFF2-40B4-BE49-F238E27FC236}">
-                <a16:creationId xmlns:a16="http://schemas.microsoft.com/office/drawing/2014/main" id="{D2DE94A1-17C0-48D1-8FAB-E25355A62BCE}"/>
-              </a:ext>
-            </a:extLst>
-          </p:cNvPr>
+          <p:cNvPr id="4" name="Datumsplatzhalter 3"/>
           <p:cNvSpPr>
             <a:spLocks noGrp="1"/>
           </p:cNvSpPr>
@@ -13840,7 +14140,7 @@
           <a:bodyPr/>
           <a:lstStyle/>
           <a:p>
-            <a:fld id="{16BBF690-EDEA-4878-8544-36D02AD65506}" type="datetime1">
+            <a:fld id="{FF78DB55-C754-4AB2-B9F1-CF00D12F7BCC}" type="datetime1">
               <a:rPr lang="de-DE" smtClean="0"/>
               <a:t>03.12.2018</a:t>
             </a:fld>
@@ -13850,13 +14150,7 @@
       </p:sp>
       <p:sp>
         <p:nvSpPr>
-          <p:cNvPr id="5" name="Fußzeilenplatzhalter 4">
-            <a:extLst>
-              <a:ext uri="{FF2B5EF4-FFF2-40B4-BE49-F238E27FC236}">
-                <a16:creationId xmlns:a16="http://schemas.microsoft.com/office/drawing/2014/main" id="{27D3DE53-672C-4016-A2BF-C5C0CA708938}"/>
-              </a:ext>
-            </a:extLst>
-          </p:cNvPr>
+          <p:cNvPr id="5" name="Fußzeilenplatzhalter 4"/>
           <p:cNvSpPr>
             <a:spLocks noGrp="1"/>
           </p:cNvSpPr>
@@ -13870,7 +14164,7 @@
           <a:lstStyle/>
           <a:p>
             <a:r>
-              <a:rPr lang="de-DE"/>
+              <a:rPr lang="de-DE" smtClean="0"/>
               <a:t>Bosin, Espig, Lauenroth, Siefert, Techel</a:t>
             </a:r>
             <a:endParaRPr lang="en-US" dirty="0"/>
@@ -13879,13 +14173,7 @@
       </p:sp>
       <p:sp>
         <p:nvSpPr>
-          <p:cNvPr id="6" name="Foliennummernplatzhalter 5">
-            <a:extLst>
-              <a:ext uri="{FF2B5EF4-FFF2-40B4-BE49-F238E27FC236}">
-                <a16:creationId xmlns:a16="http://schemas.microsoft.com/office/drawing/2014/main" id="{42D1B134-44D3-4475-89B3-F71CF8EE8DD5}"/>
-              </a:ext>
-            </a:extLst>
-          </p:cNvPr>
+          <p:cNvPr id="6" name="Foliennummernplatzhalter 5"/>
           <p:cNvSpPr>
             <a:spLocks noGrp="1"/>
           </p:cNvSpPr>
@@ -13909,7 +14197,7 @@
     </p:spTree>
     <p:extLst>
       <p:ext uri="{BB962C8B-B14F-4D97-AF65-F5344CB8AC3E}">
-        <p14:creationId xmlns:p14="http://schemas.microsoft.com/office/powerpoint/2010/main" val="152518024"/>
+        <p14:creationId xmlns:p14="http://schemas.microsoft.com/office/powerpoint/2010/main" val="1986882840"/>
       </p:ext>
     </p:extLst>
   </p:cSld>
@@ -13938,13 +14226,7 @@
       </p:grpSpPr>
       <p:sp>
         <p:nvSpPr>
-          <p:cNvPr id="2" name="Titel 1">
-            <a:extLst>
-              <a:ext uri="{FF2B5EF4-FFF2-40B4-BE49-F238E27FC236}">
-                <a16:creationId xmlns:a16="http://schemas.microsoft.com/office/drawing/2014/main" id="{03FD57A2-14B8-4EE4-A02B-29DEF1978A65}"/>
-              </a:ext>
-            </a:extLst>
-          </p:cNvPr>
+          <p:cNvPr id="2" name="Titel 1"/>
           <p:cNvSpPr>
             <a:spLocks noGrp="1"/>
           </p:cNvSpPr>
@@ -13958,21 +14240,16 @@
           <a:lstStyle/>
           <a:p>
             <a:r>
-              <a:rPr lang="de-DE" dirty="0"/>
-              <a:t>Eigene Eindrücke</a:t>
+              <a:rPr lang="de-DE" dirty="0" smtClean="0"/>
+              <a:t>Testprotokolle</a:t>
             </a:r>
-          </a:p>
-        </p:txBody>
-      </p:sp>
-      <p:sp>
-        <p:nvSpPr>
-          <p:cNvPr id="3" name="Inhaltsplatzhalter 2">
-            <a:extLst>
-              <a:ext uri="{FF2B5EF4-FFF2-40B4-BE49-F238E27FC236}">
-                <a16:creationId xmlns:a16="http://schemas.microsoft.com/office/drawing/2014/main" id="{A72392CE-DCDF-4855-9E88-365021A93C6C}"/>
-              </a:ext>
-            </a:extLst>
-          </p:cNvPr>
+            <a:endParaRPr lang="de-DE" dirty="0"/>
+          </a:p>
+        </p:txBody>
+      </p:sp>
+      <p:sp>
+        <p:nvSpPr>
+          <p:cNvPr id="3" name="Inhaltsplatzhalter 2"/>
           <p:cNvSpPr>
             <a:spLocks noGrp="1"/>
           </p:cNvSpPr>
@@ -13985,19 +14262,13 @@
           <a:bodyPr/>
           <a:lstStyle/>
           <a:p>
-            <a:endParaRPr lang="de-DE" dirty="0"/>
-          </a:p>
-        </p:txBody>
-      </p:sp>
-      <p:sp>
-        <p:nvSpPr>
-          <p:cNvPr id="4" name="Datumsplatzhalter 3">
-            <a:extLst>
-              <a:ext uri="{FF2B5EF4-FFF2-40B4-BE49-F238E27FC236}">
-                <a16:creationId xmlns:a16="http://schemas.microsoft.com/office/drawing/2014/main" id="{AAC72671-405C-4324-8617-159D7E4B4144}"/>
-              </a:ext>
-            </a:extLst>
-          </p:cNvPr>
+            <a:endParaRPr lang="de-DE"/>
+          </a:p>
+        </p:txBody>
+      </p:sp>
+      <p:sp>
+        <p:nvSpPr>
+          <p:cNvPr id="4" name="Datumsplatzhalter 3"/>
           <p:cNvSpPr>
             <a:spLocks noGrp="1"/>
           </p:cNvSpPr>
@@ -14010,7 +14281,7 @@
           <a:bodyPr/>
           <a:lstStyle/>
           <a:p>
-            <a:fld id="{AEE2B4A9-8F5E-4B84-8661-FDAE7821C466}" type="datetime1">
+            <a:fld id="{FF78DB55-C754-4AB2-B9F1-CF00D12F7BCC}" type="datetime1">
               <a:rPr lang="de-DE" smtClean="0"/>
               <a:t>03.12.2018</a:t>
             </a:fld>
@@ -14020,13 +14291,7 @@
       </p:sp>
       <p:sp>
         <p:nvSpPr>
-          <p:cNvPr id="5" name="Fußzeilenplatzhalter 4">
-            <a:extLst>
-              <a:ext uri="{FF2B5EF4-FFF2-40B4-BE49-F238E27FC236}">
-                <a16:creationId xmlns:a16="http://schemas.microsoft.com/office/drawing/2014/main" id="{B32BF021-8C3F-4D6C-9960-69040C7827C0}"/>
-              </a:ext>
-            </a:extLst>
-          </p:cNvPr>
+          <p:cNvPr id="5" name="Fußzeilenplatzhalter 4"/>
           <p:cNvSpPr>
             <a:spLocks noGrp="1"/>
           </p:cNvSpPr>
@@ -14040,7 +14305,7 @@
           <a:lstStyle/>
           <a:p>
             <a:r>
-              <a:rPr lang="de-DE" dirty="0"/>
+              <a:rPr lang="de-DE" smtClean="0"/>
               <a:t>Bosin, Espig, Lauenroth, Siefert, Techel</a:t>
             </a:r>
             <a:endParaRPr lang="en-US" dirty="0"/>
@@ -14049,13 +14314,7 @@
       </p:sp>
       <p:sp>
         <p:nvSpPr>
-          <p:cNvPr id="6" name="Foliennummernplatzhalter 5">
-            <a:extLst>
-              <a:ext uri="{FF2B5EF4-FFF2-40B4-BE49-F238E27FC236}">
-                <a16:creationId xmlns:a16="http://schemas.microsoft.com/office/drawing/2014/main" id="{4F7659D2-FB7D-437D-AB9C-CF2D17066A96}"/>
-              </a:ext>
-            </a:extLst>
-          </p:cNvPr>
+          <p:cNvPr id="6" name="Foliennummernplatzhalter 5"/>
           <p:cNvSpPr>
             <a:spLocks noGrp="1"/>
           </p:cNvSpPr>
@@ -14079,7 +14338,177 @@
     </p:spTree>
     <p:extLst>
       <p:ext uri="{BB962C8B-B14F-4D97-AF65-F5344CB8AC3E}">
-        <p14:creationId xmlns:p14="http://schemas.microsoft.com/office/powerpoint/2010/main" val="1140022867"/>
+        <p14:creationId xmlns:p14="http://schemas.microsoft.com/office/powerpoint/2010/main" val="4041166535"/>
+      </p:ext>
+    </p:extLst>
+  </p:cSld>
+  <p:clrMapOvr>
+    <a:masterClrMapping/>
+  </p:clrMapOvr>
+</p:sld>
+</file>
+
+<file path=ppt/slides/slide9.xml><?xml version="1.0" encoding="utf-8"?>
+<p:sld xmlns:a="http://schemas.openxmlformats.org/drawingml/2006/main" xmlns:r="http://schemas.openxmlformats.org/officeDocument/2006/relationships" xmlns:p="http://schemas.openxmlformats.org/presentationml/2006/main">
+  <p:cSld>
+    <p:spTree>
+      <p:nvGrpSpPr>
+        <p:cNvPr id="1" name=""/>
+        <p:cNvGrpSpPr/>
+        <p:nvPr/>
+      </p:nvGrpSpPr>
+      <p:grpSpPr>
+        <a:xfrm>
+          <a:off x="0" y="0"/>
+          <a:ext cx="0" cy="0"/>
+          <a:chOff x="0" y="0"/>
+          <a:chExt cx="0" cy="0"/>
+        </a:xfrm>
+      </p:grpSpPr>
+      <p:sp>
+        <p:nvSpPr>
+          <p:cNvPr id="2" name="Titel 1">
+            <a:extLst>
+              <a:ext uri="{FF2B5EF4-FFF2-40B4-BE49-F238E27FC236}">
+                <a16:creationId xmlns:a16="http://schemas.microsoft.com/office/drawing/2014/main" id="{88B74F27-9CBE-419F-A429-4D948C81C3BB}"/>
+              </a:ext>
+            </a:extLst>
+          </p:cNvPr>
+          <p:cNvSpPr>
+            <a:spLocks noGrp="1"/>
+          </p:cNvSpPr>
+          <p:nvPr>
+            <p:ph type="title"/>
+          </p:nvPr>
+        </p:nvSpPr>
+        <p:spPr/>
+        <p:txBody>
+          <a:bodyPr/>
+          <a:lstStyle/>
+          <a:p>
+            <a:r>
+              <a:rPr lang="de-DE" dirty="0"/>
+              <a:t>Projektstand</a:t>
+            </a:r>
+          </a:p>
+        </p:txBody>
+      </p:sp>
+      <p:sp>
+        <p:nvSpPr>
+          <p:cNvPr id="3" name="Inhaltsplatzhalter 2">
+            <a:extLst>
+              <a:ext uri="{FF2B5EF4-FFF2-40B4-BE49-F238E27FC236}">
+                <a16:creationId xmlns:a16="http://schemas.microsoft.com/office/drawing/2014/main" id="{998602D6-0B61-45AF-B8CF-37D49DF8F6B0}"/>
+              </a:ext>
+            </a:extLst>
+          </p:cNvPr>
+          <p:cNvSpPr>
+            <a:spLocks noGrp="1"/>
+          </p:cNvSpPr>
+          <p:nvPr>
+            <p:ph idx="1"/>
+          </p:nvPr>
+        </p:nvSpPr>
+        <p:spPr/>
+        <p:txBody>
+          <a:bodyPr/>
+          <a:lstStyle/>
+          <a:p>
+            <a:endParaRPr lang="de-DE"/>
+          </a:p>
+        </p:txBody>
+      </p:sp>
+      <p:sp>
+        <p:nvSpPr>
+          <p:cNvPr id="4" name="Datumsplatzhalter 3">
+            <a:extLst>
+              <a:ext uri="{FF2B5EF4-FFF2-40B4-BE49-F238E27FC236}">
+                <a16:creationId xmlns:a16="http://schemas.microsoft.com/office/drawing/2014/main" id="{17CA8981-94D5-466D-86BA-414D50D3DA3C}"/>
+              </a:ext>
+            </a:extLst>
+          </p:cNvPr>
+          <p:cNvSpPr>
+            <a:spLocks noGrp="1"/>
+          </p:cNvSpPr>
+          <p:nvPr>
+            <p:ph type="dt" sz="half" idx="10"/>
+          </p:nvPr>
+        </p:nvSpPr>
+        <p:spPr/>
+        <p:txBody>
+          <a:bodyPr/>
+          <a:lstStyle/>
+          <a:p>
+            <a:fld id="{5D7886D7-8107-45E6-97F3-CCD9494AACB9}" type="datetime1">
+              <a:rPr lang="de-DE" smtClean="0"/>
+              <a:t>03.12.2018</a:t>
+            </a:fld>
+            <a:endParaRPr lang="en-US" dirty="0"/>
+          </a:p>
+        </p:txBody>
+      </p:sp>
+      <p:sp>
+        <p:nvSpPr>
+          <p:cNvPr id="5" name="Fußzeilenplatzhalter 4">
+            <a:extLst>
+              <a:ext uri="{FF2B5EF4-FFF2-40B4-BE49-F238E27FC236}">
+                <a16:creationId xmlns:a16="http://schemas.microsoft.com/office/drawing/2014/main" id="{51CD46FE-E2F8-4F36-9798-EA2C0B431472}"/>
+              </a:ext>
+            </a:extLst>
+          </p:cNvPr>
+          <p:cNvSpPr>
+            <a:spLocks noGrp="1"/>
+          </p:cNvSpPr>
+          <p:nvPr>
+            <p:ph type="ftr" sz="quarter" idx="11"/>
+          </p:nvPr>
+        </p:nvSpPr>
+        <p:spPr/>
+        <p:txBody>
+          <a:bodyPr/>
+          <a:lstStyle/>
+          <a:p>
+            <a:r>
+              <a:rPr lang="de-DE"/>
+              <a:t>Bosin, Espig, Lauenroth, Siefert, Techel</a:t>
+            </a:r>
+            <a:endParaRPr lang="en-US" dirty="0"/>
+          </a:p>
+        </p:txBody>
+      </p:sp>
+      <p:sp>
+        <p:nvSpPr>
+          <p:cNvPr id="6" name="Foliennummernplatzhalter 5">
+            <a:extLst>
+              <a:ext uri="{FF2B5EF4-FFF2-40B4-BE49-F238E27FC236}">
+                <a16:creationId xmlns:a16="http://schemas.microsoft.com/office/drawing/2014/main" id="{BE6718E8-5376-4C31-96DF-487D1C462FC1}"/>
+              </a:ext>
+            </a:extLst>
+          </p:cNvPr>
+          <p:cNvSpPr>
+            <a:spLocks noGrp="1"/>
+          </p:cNvSpPr>
+          <p:nvPr>
+            <p:ph type="sldNum" sz="quarter" idx="12"/>
+          </p:nvPr>
+        </p:nvSpPr>
+        <p:spPr/>
+        <p:txBody>
+          <a:bodyPr/>
+          <a:lstStyle/>
+          <a:p>
+            <a:fld id="{6D22F896-40B5-4ADD-8801-0D06FADFA095}" type="slidenum">
+              <a:rPr lang="en-US" smtClean="0"/>
+              <a:t>9</a:t>
+            </a:fld>
+            <a:endParaRPr lang="en-US" dirty="0"/>
+          </a:p>
+        </p:txBody>
+      </p:sp>
+    </p:spTree>
+    <p:extLst>
+      <p:ext uri="{BB962C8B-B14F-4D97-AF65-F5344CB8AC3E}">
+        <p14:creationId xmlns:p14="http://schemas.microsoft.com/office/powerpoint/2010/main" val="1130107068"/>
       </p:ext>
     </p:extLst>
   </p:cSld>

</xml_diff>